<commit_message>
updated with notes and talking points
</commit_message>
<xml_diff>
--- a/Electronic Sales.pptx
+++ b/Electronic Sales.pptx
@@ -4,6 +4,9 @@
   <p:sldMasterIdLst>
     <p:sldMasterId id="2147483699" r:id="rId1"/>
   </p:sldMasterIdLst>
+  <p:notesMasterIdLst>
+    <p:notesMasterId r:id="rId8"/>
+  </p:notesMasterIdLst>
   <p:sldIdLst>
     <p:sldId id="256" r:id="rId2"/>
     <p:sldId id="257" r:id="rId3"/>
@@ -109,7 +112,150 @@
       </a:defRPr>
     </a:lvl9pPr>
   </p:defaultTextStyle>
+  <p:extLst>
+    <p:ext uri="{EFAFB233-063F-42B5-8137-9DF3F51BA10A}">
+      <p15:sldGuideLst xmlns:p15="http://schemas.microsoft.com/office/powerpoint/2012/main"/>
+    </p:ext>
+  </p:extLst>
 </p:presentation>
+</file>
+
+<file path=ppt/changesInfos/changesInfo1.xml><?xml version="1.0" encoding="utf-8"?>
+<pc:chgInfo xmlns:a="http://schemas.openxmlformats.org/drawingml/2006/main" xmlns:r="http://schemas.openxmlformats.org/officeDocument/2006/relationships" xmlns:ac="http://schemas.microsoft.com/office/drawing/2013/main/command" xmlns:pc="http://schemas.microsoft.com/office/powerpoint/2013/main/command">
+  <pc:docChgLst>
+    <pc:chgData name="Jessica Louden" userId="8b3acd50d60ee0a2" providerId="LiveId" clId="{CA3EFC75-08BA-4A31-A289-A39EDD7367A7}"/>
+    <pc:docChg chg="custSel modSld">
+      <pc:chgData name="Jessica Louden" userId="8b3acd50d60ee0a2" providerId="LiveId" clId="{CA3EFC75-08BA-4A31-A289-A39EDD7367A7}" dt="2024-06-25T15:29:43.833" v="770" actId="20577"/>
+      <pc:docMkLst>
+        <pc:docMk/>
+      </pc:docMkLst>
+      <pc:sldChg chg="modNotesTx">
+        <pc:chgData name="Jessica Louden" userId="8b3acd50d60ee0a2" providerId="LiveId" clId="{CA3EFC75-08BA-4A31-A289-A39EDD7367A7}" dt="2024-06-25T15:18:58.684" v="152" actId="33524"/>
+        <pc:sldMkLst>
+          <pc:docMk/>
+          <pc:sldMk cId="3039671343" sldId="258"/>
+        </pc:sldMkLst>
+      </pc:sldChg>
+      <pc:sldChg chg="modNotesTx">
+        <pc:chgData name="Jessica Louden" userId="8b3acd50d60ee0a2" providerId="LiveId" clId="{CA3EFC75-08BA-4A31-A289-A39EDD7367A7}" dt="2024-06-25T15:24:21.315" v="291" actId="20577"/>
+        <pc:sldMkLst>
+          <pc:docMk/>
+          <pc:sldMk cId="1459016965" sldId="259"/>
+        </pc:sldMkLst>
+      </pc:sldChg>
+      <pc:sldChg chg="addSp delSp modSp mod modNotesTx">
+        <pc:chgData name="Jessica Louden" userId="8b3acd50d60ee0a2" providerId="LiveId" clId="{CA3EFC75-08BA-4A31-A289-A39EDD7367A7}" dt="2024-06-25T15:28:42.673" v="542" actId="20577"/>
+        <pc:sldMkLst>
+          <pc:docMk/>
+          <pc:sldMk cId="4239701883" sldId="260"/>
+        </pc:sldMkLst>
+        <pc:spChg chg="mod">
+          <ac:chgData name="Jessica Louden" userId="8b3acd50d60ee0a2" providerId="LiveId" clId="{CA3EFC75-08BA-4A31-A289-A39EDD7367A7}" dt="2024-06-25T15:27:42.280" v="421" actId="26606"/>
+          <ac:spMkLst>
+            <pc:docMk/>
+            <pc:sldMk cId="4239701883" sldId="260"/>
+            <ac:spMk id="2" creationId="{6EC0F6E9-FFCB-86A7-FC0D-EDED37ECC57D}"/>
+          </ac:spMkLst>
+        </pc:spChg>
+        <pc:spChg chg="mod">
+          <ac:chgData name="Jessica Louden" userId="8b3acd50d60ee0a2" providerId="LiveId" clId="{CA3EFC75-08BA-4A31-A289-A39EDD7367A7}" dt="2024-06-25T15:27:42.280" v="421" actId="26606"/>
+          <ac:spMkLst>
+            <pc:docMk/>
+            <pc:sldMk cId="4239701883" sldId="260"/>
+            <ac:spMk id="3" creationId="{C1510AC6-1518-CB00-74C0-434E4ED7FCBE}"/>
+          </ac:spMkLst>
+        </pc:spChg>
+        <pc:spChg chg="del">
+          <ac:chgData name="Jessica Louden" userId="8b3acd50d60ee0a2" providerId="LiveId" clId="{CA3EFC75-08BA-4A31-A289-A39EDD7367A7}" dt="2024-06-25T15:27:42.280" v="421" actId="26606"/>
+          <ac:spMkLst>
+            <pc:docMk/>
+            <pc:sldMk cId="4239701883" sldId="260"/>
+            <ac:spMk id="10" creationId="{2C9A9DA9-7DC8-488B-A882-123947B0F3D9}"/>
+          </ac:spMkLst>
+        </pc:spChg>
+        <pc:spChg chg="del">
+          <ac:chgData name="Jessica Louden" userId="8b3acd50d60ee0a2" providerId="LiveId" clId="{CA3EFC75-08BA-4A31-A289-A39EDD7367A7}" dt="2024-06-25T15:27:42.280" v="421" actId="26606"/>
+          <ac:spMkLst>
+            <pc:docMk/>
+            <pc:sldMk cId="4239701883" sldId="260"/>
+            <ac:spMk id="12" creationId="{57F6BDD4-E066-4008-8011-6CC31AEB4556}"/>
+          </ac:spMkLst>
+        </pc:spChg>
+        <pc:spChg chg="del">
+          <ac:chgData name="Jessica Louden" userId="8b3acd50d60ee0a2" providerId="LiveId" clId="{CA3EFC75-08BA-4A31-A289-A39EDD7367A7}" dt="2024-06-25T15:27:42.280" v="421" actId="26606"/>
+          <ac:spMkLst>
+            <pc:docMk/>
+            <pc:sldMk cId="4239701883" sldId="260"/>
+            <ac:spMk id="14" creationId="{2711A8FB-68FC-45FC-B01E-38F809E2D439}"/>
+          </ac:spMkLst>
+        </pc:spChg>
+        <pc:spChg chg="del">
+          <ac:chgData name="Jessica Louden" userId="8b3acd50d60ee0a2" providerId="LiveId" clId="{CA3EFC75-08BA-4A31-A289-A39EDD7367A7}" dt="2024-06-25T15:27:42.280" v="421" actId="26606"/>
+          <ac:spMkLst>
+            <pc:docMk/>
+            <pc:sldMk cId="4239701883" sldId="260"/>
+            <ac:spMk id="16" creationId="{2A865FE3-5FC9-4049-87CF-30019C46C0F5}"/>
+          </ac:spMkLst>
+        </pc:spChg>
+        <pc:spChg chg="add">
+          <ac:chgData name="Jessica Louden" userId="8b3acd50d60ee0a2" providerId="LiveId" clId="{CA3EFC75-08BA-4A31-A289-A39EDD7367A7}" dt="2024-06-25T15:27:42.280" v="421" actId="26606"/>
+          <ac:spMkLst>
+            <pc:docMk/>
+            <pc:sldMk cId="4239701883" sldId="260"/>
+            <ac:spMk id="21" creationId="{385E1BDC-A9B0-4A87-82E3-F3187F69A802}"/>
+          </ac:spMkLst>
+        </pc:spChg>
+        <pc:spChg chg="add">
+          <ac:chgData name="Jessica Louden" userId="8b3acd50d60ee0a2" providerId="LiveId" clId="{CA3EFC75-08BA-4A31-A289-A39EDD7367A7}" dt="2024-06-25T15:27:42.280" v="421" actId="26606"/>
+          <ac:spMkLst>
+            <pc:docMk/>
+            <pc:sldMk cId="4239701883" sldId="260"/>
+            <ac:spMk id="23" creationId="{0990C621-3B8B-4820-8328-D47EF7CE823C}"/>
+          </ac:spMkLst>
+        </pc:spChg>
+        <pc:spChg chg="add">
+          <ac:chgData name="Jessica Louden" userId="8b3acd50d60ee0a2" providerId="LiveId" clId="{CA3EFC75-08BA-4A31-A289-A39EDD7367A7}" dt="2024-06-25T15:27:42.280" v="421" actId="26606"/>
+          <ac:spMkLst>
+            <pc:docMk/>
+            <pc:sldMk cId="4239701883" sldId="260"/>
+            <ac:spMk id="25" creationId="{C1A2385B-1D2A-4E17-84FA-6CB7F0AAE473}"/>
+          </ac:spMkLst>
+        </pc:spChg>
+        <pc:spChg chg="add">
+          <ac:chgData name="Jessica Louden" userId="8b3acd50d60ee0a2" providerId="LiveId" clId="{CA3EFC75-08BA-4A31-A289-A39EDD7367A7}" dt="2024-06-25T15:27:42.280" v="421" actId="26606"/>
+          <ac:spMkLst>
+            <pc:docMk/>
+            <pc:sldMk cId="4239701883" sldId="260"/>
+            <ac:spMk id="27" creationId="{5E791F2F-79DB-4CC0-9FA1-001E3E91E8B7}"/>
+          </ac:spMkLst>
+        </pc:spChg>
+        <pc:picChg chg="mod">
+          <ac:chgData name="Jessica Louden" userId="8b3acd50d60ee0a2" providerId="LiveId" clId="{CA3EFC75-08BA-4A31-A289-A39EDD7367A7}" dt="2024-06-25T15:27:42.280" v="421" actId="26606"/>
+          <ac:picMkLst>
+            <pc:docMk/>
+            <pc:sldMk cId="4239701883" sldId="260"/>
+            <ac:picMk id="5" creationId="{1357DA0F-B89C-9F3C-67D3-61BD0217AC47}"/>
+          </ac:picMkLst>
+        </pc:picChg>
+        <pc:picChg chg="add mod">
+          <ac:chgData name="Jessica Louden" userId="8b3acd50d60ee0a2" providerId="LiveId" clId="{CA3EFC75-08BA-4A31-A289-A39EDD7367A7}" dt="2024-06-25T15:27:42.280" v="421" actId="26606"/>
+          <ac:picMkLst>
+            <pc:docMk/>
+            <pc:sldMk cId="4239701883" sldId="260"/>
+            <ac:picMk id="6" creationId="{0F8D3F0B-0A4C-30C0-EDC0-9BFF90C5BC00}"/>
+          </ac:picMkLst>
+        </pc:picChg>
+      </pc:sldChg>
+      <pc:sldChg chg="modNotesTx">
+        <pc:chgData name="Jessica Louden" userId="8b3acd50d60ee0a2" providerId="LiveId" clId="{CA3EFC75-08BA-4A31-A289-A39EDD7367A7}" dt="2024-06-25T15:29:43.833" v="770" actId="20577"/>
+        <pc:sldMkLst>
+          <pc:docMk/>
+          <pc:sldMk cId="481075254" sldId="261"/>
+        </pc:sldMkLst>
+      </pc:sldChg>
+    </pc:docChg>
+  </pc:docChgLst>
+</pc:chgInfo>
 </file>
 
 <file path=ppt/diagrams/colors1.xml><?xml version="1.0" encoding="utf-8"?>
@@ -3005,6 +3151,707 @@
 </dgm:styleDef>
 </file>
 
+<file path=ppt/notesMasters/notesMaster1.xml><?xml version="1.0" encoding="utf-8"?>
+<p:notesMaster xmlns:a="http://schemas.openxmlformats.org/drawingml/2006/main" xmlns:r="http://schemas.openxmlformats.org/officeDocument/2006/relationships" xmlns:p="http://schemas.openxmlformats.org/presentationml/2006/main">
+  <p:cSld>
+    <p:bg>
+      <p:bgRef idx="1001">
+        <a:schemeClr val="bg1"/>
+      </p:bgRef>
+    </p:bg>
+    <p:spTree>
+      <p:nvGrpSpPr>
+        <p:cNvPr id="1" name=""/>
+        <p:cNvGrpSpPr/>
+        <p:nvPr/>
+      </p:nvGrpSpPr>
+      <p:grpSpPr>
+        <a:xfrm>
+          <a:off x="0" y="0"/>
+          <a:ext cx="0" cy="0"/>
+          <a:chOff x="0" y="0"/>
+          <a:chExt cx="0" cy="0"/>
+        </a:xfrm>
+      </p:grpSpPr>
+      <p:sp>
+        <p:nvSpPr>
+          <p:cNvPr id="2" name="Header Placeholder 1"/>
+          <p:cNvSpPr>
+            <a:spLocks noGrp="1"/>
+          </p:cNvSpPr>
+          <p:nvPr>
+            <p:ph type="hdr" sz="quarter"/>
+          </p:nvPr>
+        </p:nvSpPr>
+        <p:spPr>
+          <a:xfrm>
+            <a:off x="0" y="0"/>
+            <a:ext cx="2971800" cy="458788"/>
+          </a:xfrm>
+          <a:prstGeom prst="rect">
+            <a:avLst/>
+          </a:prstGeom>
+        </p:spPr>
+        <p:txBody>
+          <a:bodyPr vert="horz" lIns="91440" tIns="45720" rIns="91440" bIns="45720" rtlCol="0"/>
+          <a:lstStyle>
+            <a:lvl1pPr algn="l">
+              <a:defRPr sz="1200"/>
+            </a:lvl1pPr>
+          </a:lstStyle>
+          <a:p>
+            <a:endParaRPr lang="en-US"/>
+          </a:p>
+        </p:txBody>
+      </p:sp>
+      <p:sp>
+        <p:nvSpPr>
+          <p:cNvPr id="3" name="Date Placeholder 2"/>
+          <p:cNvSpPr>
+            <a:spLocks noGrp="1"/>
+          </p:cNvSpPr>
+          <p:nvPr>
+            <p:ph type="dt" idx="1"/>
+          </p:nvPr>
+        </p:nvSpPr>
+        <p:spPr>
+          <a:xfrm>
+            <a:off x="3884613" y="0"/>
+            <a:ext cx="2971800" cy="458788"/>
+          </a:xfrm>
+          <a:prstGeom prst="rect">
+            <a:avLst/>
+          </a:prstGeom>
+        </p:spPr>
+        <p:txBody>
+          <a:bodyPr vert="horz" lIns="91440" tIns="45720" rIns="91440" bIns="45720" rtlCol="0"/>
+          <a:lstStyle>
+            <a:lvl1pPr algn="r">
+              <a:defRPr sz="1200"/>
+            </a:lvl1pPr>
+          </a:lstStyle>
+          <a:p>
+            <a:fld id="{D7476C61-0204-414F-9112-F16DFCA837FB}" type="datetimeFigureOut">
+              <a:rPr lang="en-US" smtClean="0"/>
+              <a:t>6/25/2024</a:t>
+            </a:fld>
+            <a:endParaRPr lang="en-US"/>
+          </a:p>
+        </p:txBody>
+      </p:sp>
+      <p:sp>
+        <p:nvSpPr>
+          <p:cNvPr id="4" name="Slide Image Placeholder 3"/>
+          <p:cNvSpPr>
+            <a:spLocks noGrp="1" noRot="1" noChangeAspect="1"/>
+          </p:cNvSpPr>
+          <p:nvPr>
+            <p:ph type="sldImg" idx="2"/>
+          </p:nvPr>
+        </p:nvSpPr>
+        <p:spPr>
+          <a:xfrm>
+            <a:off x="685800" y="1143000"/>
+            <a:ext cx="5486400" cy="3086100"/>
+          </a:xfrm>
+          <a:prstGeom prst="rect">
+            <a:avLst/>
+          </a:prstGeom>
+          <a:noFill/>
+          <a:ln w="12700">
+            <a:solidFill>
+              <a:prstClr val="black"/>
+            </a:solidFill>
+          </a:ln>
+        </p:spPr>
+        <p:txBody>
+          <a:bodyPr vert="horz" lIns="91440" tIns="45720" rIns="91440" bIns="45720" rtlCol="0" anchor="ctr"/>
+          <a:lstStyle/>
+          <a:p>
+            <a:endParaRPr lang="en-US"/>
+          </a:p>
+        </p:txBody>
+      </p:sp>
+      <p:sp>
+        <p:nvSpPr>
+          <p:cNvPr id="5" name="Notes Placeholder 4"/>
+          <p:cNvSpPr>
+            <a:spLocks noGrp="1"/>
+          </p:cNvSpPr>
+          <p:nvPr>
+            <p:ph type="body" sz="quarter" idx="3"/>
+          </p:nvPr>
+        </p:nvSpPr>
+        <p:spPr>
+          <a:xfrm>
+            <a:off x="685800" y="4400550"/>
+            <a:ext cx="5486400" cy="3600450"/>
+          </a:xfrm>
+          <a:prstGeom prst="rect">
+            <a:avLst/>
+          </a:prstGeom>
+        </p:spPr>
+        <p:txBody>
+          <a:bodyPr vert="horz" lIns="91440" tIns="45720" rIns="91440" bIns="45720" rtlCol="0"/>
+          <a:lstStyle/>
+          <a:p>
+            <a:pPr lvl="0"/>
+            <a:r>
+              <a:rPr lang="en-US"/>
+              <a:t>Click to edit Master text styles</a:t>
+            </a:r>
+          </a:p>
+          <a:p>
+            <a:pPr lvl="1"/>
+            <a:r>
+              <a:rPr lang="en-US"/>
+              <a:t>Second level</a:t>
+            </a:r>
+          </a:p>
+          <a:p>
+            <a:pPr lvl="2"/>
+            <a:r>
+              <a:rPr lang="en-US"/>
+              <a:t>Third level</a:t>
+            </a:r>
+          </a:p>
+          <a:p>
+            <a:pPr lvl="3"/>
+            <a:r>
+              <a:rPr lang="en-US"/>
+              <a:t>Fourth level</a:t>
+            </a:r>
+          </a:p>
+          <a:p>
+            <a:pPr lvl="4"/>
+            <a:r>
+              <a:rPr lang="en-US"/>
+              <a:t>Fifth level</a:t>
+            </a:r>
+          </a:p>
+        </p:txBody>
+      </p:sp>
+      <p:sp>
+        <p:nvSpPr>
+          <p:cNvPr id="6" name="Footer Placeholder 5"/>
+          <p:cNvSpPr>
+            <a:spLocks noGrp="1"/>
+          </p:cNvSpPr>
+          <p:nvPr>
+            <p:ph type="ftr" sz="quarter" idx="4"/>
+          </p:nvPr>
+        </p:nvSpPr>
+        <p:spPr>
+          <a:xfrm>
+            <a:off x="0" y="8685213"/>
+            <a:ext cx="2971800" cy="458787"/>
+          </a:xfrm>
+          <a:prstGeom prst="rect">
+            <a:avLst/>
+          </a:prstGeom>
+        </p:spPr>
+        <p:txBody>
+          <a:bodyPr vert="horz" lIns="91440" tIns="45720" rIns="91440" bIns="45720" rtlCol="0" anchor="b"/>
+          <a:lstStyle>
+            <a:lvl1pPr algn="l">
+              <a:defRPr sz="1200"/>
+            </a:lvl1pPr>
+          </a:lstStyle>
+          <a:p>
+            <a:endParaRPr lang="en-US"/>
+          </a:p>
+        </p:txBody>
+      </p:sp>
+      <p:sp>
+        <p:nvSpPr>
+          <p:cNvPr id="7" name="Slide Number Placeholder 6"/>
+          <p:cNvSpPr>
+            <a:spLocks noGrp="1"/>
+          </p:cNvSpPr>
+          <p:nvPr>
+            <p:ph type="sldNum" sz="quarter" idx="5"/>
+          </p:nvPr>
+        </p:nvSpPr>
+        <p:spPr>
+          <a:xfrm>
+            <a:off x="3884613" y="8685213"/>
+            <a:ext cx="2971800" cy="458787"/>
+          </a:xfrm>
+          <a:prstGeom prst="rect">
+            <a:avLst/>
+          </a:prstGeom>
+        </p:spPr>
+        <p:txBody>
+          <a:bodyPr vert="horz" lIns="91440" tIns="45720" rIns="91440" bIns="45720" rtlCol="0" anchor="b"/>
+          <a:lstStyle>
+            <a:lvl1pPr algn="r">
+              <a:defRPr sz="1200"/>
+            </a:lvl1pPr>
+          </a:lstStyle>
+          <a:p>
+            <a:fld id="{A5CA74B6-EE5D-4B22-9CC7-FC7AB49D9FDA}" type="slidenum">
+              <a:rPr lang="en-US" smtClean="0"/>
+              <a:t>‹#›</a:t>
+            </a:fld>
+            <a:endParaRPr lang="en-US"/>
+          </a:p>
+        </p:txBody>
+      </p:sp>
+    </p:spTree>
+    <p:extLst>
+      <p:ext uri="{BB962C8B-B14F-4D97-AF65-F5344CB8AC3E}">
+        <p14:creationId xmlns:p14="http://schemas.microsoft.com/office/powerpoint/2010/main" val="453588022"/>
+      </p:ext>
+    </p:extLst>
+  </p:cSld>
+  <p:clrMap bg1="lt1" tx1="dk1" bg2="lt2" tx2="dk2" accent1="accent1" accent2="accent2" accent3="accent3" accent4="accent4" accent5="accent5" accent6="accent6" hlink="hlink" folHlink="folHlink"/>
+  <p:notesStyle>
+    <a:lvl1pPr marL="0" algn="l" defTabSz="914400" rtl="0" eaLnBrk="1" latinLnBrk="0" hangingPunct="1">
+      <a:defRPr sz="1200" kern="1200">
+        <a:solidFill>
+          <a:schemeClr val="tx1"/>
+        </a:solidFill>
+        <a:latin typeface="+mn-lt"/>
+        <a:ea typeface="+mn-ea"/>
+        <a:cs typeface="+mn-cs"/>
+      </a:defRPr>
+    </a:lvl1pPr>
+    <a:lvl2pPr marL="457200" algn="l" defTabSz="914400" rtl="0" eaLnBrk="1" latinLnBrk="0" hangingPunct="1">
+      <a:defRPr sz="1200" kern="1200">
+        <a:solidFill>
+          <a:schemeClr val="tx1"/>
+        </a:solidFill>
+        <a:latin typeface="+mn-lt"/>
+        <a:ea typeface="+mn-ea"/>
+        <a:cs typeface="+mn-cs"/>
+      </a:defRPr>
+    </a:lvl2pPr>
+    <a:lvl3pPr marL="914400" algn="l" defTabSz="914400" rtl="0" eaLnBrk="1" latinLnBrk="0" hangingPunct="1">
+      <a:defRPr sz="1200" kern="1200">
+        <a:solidFill>
+          <a:schemeClr val="tx1"/>
+        </a:solidFill>
+        <a:latin typeface="+mn-lt"/>
+        <a:ea typeface="+mn-ea"/>
+        <a:cs typeface="+mn-cs"/>
+      </a:defRPr>
+    </a:lvl3pPr>
+    <a:lvl4pPr marL="1371600" algn="l" defTabSz="914400" rtl="0" eaLnBrk="1" latinLnBrk="0" hangingPunct="1">
+      <a:defRPr sz="1200" kern="1200">
+        <a:solidFill>
+          <a:schemeClr val="tx1"/>
+        </a:solidFill>
+        <a:latin typeface="+mn-lt"/>
+        <a:ea typeface="+mn-ea"/>
+        <a:cs typeface="+mn-cs"/>
+      </a:defRPr>
+    </a:lvl4pPr>
+    <a:lvl5pPr marL="1828800" algn="l" defTabSz="914400" rtl="0" eaLnBrk="1" latinLnBrk="0" hangingPunct="1">
+      <a:defRPr sz="1200" kern="1200">
+        <a:solidFill>
+          <a:schemeClr val="tx1"/>
+        </a:solidFill>
+        <a:latin typeface="+mn-lt"/>
+        <a:ea typeface="+mn-ea"/>
+        <a:cs typeface="+mn-cs"/>
+      </a:defRPr>
+    </a:lvl5pPr>
+    <a:lvl6pPr marL="2286000" algn="l" defTabSz="914400" rtl="0" eaLnBrk="1" latinLnBrk="0" hangingPunct="1">
+      <a:defRPr sz="1200" kern="1200">
+        <a:solidFill>
+          <a:schemeClr val="tx1"/>
+        </a:solidFill>
+        <a:latin typeface="+mn-lt"/>
+        <a:ea typeface="+mn-ea"/>
+        <a:cs typeface="+mn-cs"/>
+      </a:defRPr>
+    </a:lvl6pPr>
+    <a:lvl7pPr marL="2743200" algn="l" defTabSz="914400" rtl="0" eaLnBrk="1" latinLnBrk="0" hangingPunct="1">
+      <a:defRPr sz="1200" kern="1200">
+        <a:solidFill>
+          <a:schemeClr val="tx1"/>
+        </a:solidFill>
+        <a:latin typeface="+mn-lt"/>
+        <a:ea typeface="+mn-ea"/>
+        <a:cs typeface="+mn-cs"/>
+      </a:defRPr>
+    </a:lvl7pPr>
+    <a:lvl8pPr marL="3200400" algn="l" defTabSz="914400" rtl="0" eaLnBrk="1" latinLnBrk="0" hangingPunct="1">
+      <a:defRPr sz="1200" kern="1200">
+        <a:solidFill>
+          <a:schemeClr val="tx1"/>
+        </a:solidFill>
+        <a:latin typeface="+mn-lt"/>
+        <a:ea typeface="+mn-ea"/>
+        <a:cs typeface="+mn-cs"/>
+      </a:defRPr>
+    </a:lvl8pPr>
+    <a:lvl9pPr marL="3657600" algn="l" defTabSz="914400" rtl="0" eaLnBrk="1" latinLnBrk="0" hangingPunct="1">
+      <a:defRPr sz="1200" kern="1200">
+        <a:solidFill>
+          <a:schemeClr val="tx1"/>
+        </a:solidFill>
+        <a:latin typeface="+mn-lt"/>
+        <a:ea typeface="+mn-ea"/>
+        <a:cs typeface="+mn-cs"/>
+      </a:defRPr>
+    </a:lvl9pPr>
+  </p:notesStyle>
+</p:notesMaster>
+</file>
+
+<file path=ppt/notesSlides/notesSlide1.xml><?xml version="1.0" encoding="utf-8"?>
+<p:notes xmlns:a="http://schemas.openxmlformats.org/drawingml/2006/main" xmlns:r="http://schemas.openxmlformats.org/officeDocument/2006/relationships" xmlns:p="http://schemas.openxmlformats.org/presentationml/2006/main">
+  <p:cSld>
+    <p:spTree>
+      <p:nvGrpSpPr>
+        <p:cNvPr id="1" name=""/>
+        <p:cNvGrpSpPr/>
+        <p:nvPr/>
+      </p:nvGrpSpPr>
+      <p:grpSpPr>
+        <a:xfrm>
+          <a:off x="0" y="0"/>
+          <a:ext cx="0" cy="0"/>
+          <a:chOff x="0" y="0"/>
+          <a:chExt cx="0" cy="0"/>
+        </a:xfrm>
+      </p:grpSpPr>
+      <p:sp>
+        <p:nvSpPr>
+          <p:cNvPr id="2" name="Slide Image Placeholder 1"/>
+          <p:cNvSpPr>
+            <a:spLocks noGrp="1" noRot="1" noChangeAspect="1"/>
+          </p:cNvSpPr>
+          <p:nvPr>
+            <p:ph type="sldImg"/>
+          </p:nvPr>
+        </p:nvSpPr>
+        <p:spPr/>
+      </p:sp>
+      <p:sp>
+        <p:nvSpPr>
+          <p:cNvPr id="3" name="Notes Placeholder 2"/>
+          <p:cNvSpPr>
+            <a:spLocks noGrp="1"/>
+          </p:cNvSpPr>
+          <p:nvPr>
+            <p:ph type="body" idx="1"/>
+          </p:nvPr>
+        </p:nvSpPr>
+        <p:spPr/>
+        <p:txBody>
+          <a:bodyPr/>
+          <a:lstStyle/>
+          <a:p>
+            <a:r>
+              <a:rPr lang="en-US" dirty="0"/>
+              <a:t>When we look at the data of all the brands sold, we can see that as a whole there isn’t a large difference in sales between brands. </a:t>
+            </a:r>
+          </a:p>
+        </p:txBody>
+      </p:sp>
+      <p:sp>
+        <p:nvSpPr>
+          <p:cNvPr id="4" name="Slide Number Placeholder 3"/>
+          <p:cNvSpPr>
+            <a:spLocks noGrp="1"/>
+          </p:cNvSpPr>
+          <p:nvPr>
+            <p:ph type="sldNum" sz="quarter" idx="5"/>
+          </p:nvPr>
+        </p:nvSpPr>
+        <p:spPr/>
+        <p:txBody>
+          <a:bodyPr/>
+          <a:lstStyle/>
+          <a:p>
+            <a:fld id="{A5CA74B6-EE5D-4B22-9CC7-FC7AB49D9FDA}" type="slidenum">
+              <a:rPr lang="en-US" smtClean="0"/>
+              <a:t>3</a:t>
+            </a:fld>
+            <a:endParaRPr lang="en-US"/>
+          </a:p>
+        </p:txBody>
+      </p:sp>
+    </p:spTree>
+    <p:extLst>
+      <p:ext uri="{BB962C8B-B14F-4D97-AF65-F5344CB8AC3E}">
+        <p14:creationId xmlns:p14="http://schemas.microsoft.com/office/powerpoint/2010/main" val="2340776765"/>
+      </p:ext>
+    </p:extLst>
+  </p:cSld>
+  <p:clrMapOvr>
+    <a:masterClrMapping/>
+  </p:clrMapOvr>
+</p:notes>
+</file>
+
+<file path=ppt/notesSlides/notesSlide2.xml><?xml version="1.0" encoding="utf-8"?>
+<p:notes xmlns:a="http://schemas.openxmlformats.org/drawingml/2006/main" xmlns:r="http://schemas.openxmlformats.org/officeDocument/2006/relationships" xmlns:p="http://schemas.openxmlformats.org/presentationml/2006/main">
+  <p:cSld>
+    <p:spTree>
+      <p:nvGrpSpPr>
+        <p:cNvPr id="1" name=""/>
+        <p:cNvGrpSpPr/>
+        <p:nvPr/>
+      </p:nvGrpSpPr>
+      <p:grpSpPr>
+        <a:xfrm>
+          <a:off x="0" y="0"/>
+          <a:ext cx="0" cy="0"/>
+          <a:chOff x="0" y="0"/>
+          <a:chExt cx="0" cy="0"/>
+        </a:xfrm>
+      </p:grpSpPr>
+      <p:sp>
+        <p:nvSpPr>
+          <p:cNvPr id="2" name="Slide Image Placeholder 1"/>
+          <p:cNvSpPr>
+            <a:spLocks noGrp="1" noRot="1" noChangeAspect="1"/>
+          </p:cNvSpPr>
+          <p:nvPr>
+            <p:ph type="sldImg"/>
+          </p:nvPr>
+        </p:nvSpPr>
+        <p:spPr/>
+      </p:sp>
+      <p:sp>
+        <p:nvSpPr>
+          <p:cNvPr id="3" name="Notes Placeholder 2"/>
+          <p:cNvSpPr>
+            <a:spLocks noGrp="1"/>
+          </p:cNvSpPr>
+          <p:nvPr>
+            <p:ph type="body" idx="1"/>
+          </p:nvPr>
+        </p:nvSpPr>
+        <p:spPr/>
+        <p:txBody>
+          <a:bodyPr/>
+          <a:lstStyle/>
+          <a:p>
+            <a:r>
+              <a:rPr lang="en-US" dirty="0"/>
+              <a:t>Based on the consumer data based on products we do see that headphones have the least amount of sales but it is not a great difference.</a:t>
+            </a:r>
+          </a:p>
+        </p:txBody>
+      </p:sp>
+      <p:sp>
+        <p:nvSpPr>
+          <p:cNvPr id="4" name="Slide Number Placeholder 3"/>
+          <p:cNvSpPr>
+            <a:spLocks noGrp="1"/>
+          </p:cNvSpPr>
+          <p:nvPr>
+            <p:ph type="sldNum" sz="quarter" idx="5"/>
+          </p:nvPr>
+        </p:nvSpPr>
+        <p:spPr/>
+        <p:txBody>
+          <a:bodyPr/>
+          <a:lstStyle/>
+          <a:p>
+            <a:fld id="{A5CA74B6-EE5D-4B22-9CC7-FC7AB49D9FDA}" type="slidenum">
+              <a:rPr lang="en-US" smtClean="0"/>
+              <a:t>4</a:t>
+            </a:fld>
+            <a:endParaRPr lang="en-US"/>
+          </a:p>
+        </p:txBody>
+      </p:sp>
+    </p:spTree>
+    <p:extLst>
+      <p:ext uri="{BB962C8B-B14F-4D97-AF65-F5344CB8AC3E}">
+        <p14:creationId xmlns:p14="http://schemas.microsoft.com/office/powerpoint/2010/main" val="2334570044"/>
+      </p:ext>
+    </p:extLst>
+  </p:cSld>
+  <p:clrMapOvr>
+    <a:masterClrMapping/>
+  </p:clrMapOvr>
+</p:notes>
+</file>
+
+<file path=ppt/notesSlides/notesSlide3.xml><?xml version="1.0" encoding="utf-8"?>
+<p:notes xmlns:a="http://schemas.openxmlformats.org/drawingml/2006/main" xmlns:r="http://schemas.openxmlformats.org/officeDocument/2006/relationships" xmlns:p="http://schemas.openxmlformats.org/presentationml/2006/main">
+  <p:cSld>
+    <p:spTree>
+      <p:nvGrpSpPr>
+        <p:cNvPr id="1" name=""/>
+        <p:cNvGrpSpPr/>
+        <p:nvPr/>
+      </p:nvGrpSpPr>
+      <p:grpSpPr>
+        <a:xfrm>
+          <a:off x="0" y="0"/>
+          <a:ext cx="0" cy="0"/>
+          <a:chOff x="0" y="0"/>
+          <a:chExt cx="0" cy="0"/>
+        </a:xfrm>
+      </p:grpSpPr>
+      <p:sp>
+        <p:nvSpPr>
+          <p:cNvPr id="2" name="Slide Image Placeholder 1"/>
+          <p:cNvSpPr>
+            <a:spLocks noGrp="1" noRot="1" noChangeAspect="1"/>
+          </p:cNvSpPr>
+          <p:nvPr>
+            <p:ph type="sldImg"/>
+          </p:nvPr>
+        </p:nvSpPr>
+        <p:spPr/>
+      </p:sp>
+      <p:sp>
+        <p:nvSpPr>
+          <p:cNvPr id="3" name="Notes Placeholder 2"/>
+          <p:cNvSpPr>
+            <a:spLocks noGrp="1"/>
+          </p:cNvSpPr>
+          <p:nvPr>
+            <p:ph type="body" idx="1"/>
+          </p:nvPr>
+        </p:nvSpPr>
+        <p:spPr/>
+        <p:txBody>
+          <a:bodyPr/>
+          <a:lstStyle/>
+          <a:p>
+            <a:r>
+              <a:rPr lang="en-US" dirty="0"/>
+              <a:t>From this heatmap there isn’t great correlation between the product or the brand. Based on the numbers we show a large variety of in age, products and brands.</a:t>
+            </a:r>
+          </a:p>
+        </p:txBody>
+      </p:sp>
+      <p:sp>
+        <p:nvSpPr>
+          <p:cNvPr id="4" name="Slide Number Placeholder 3"/>
+          <p:cNvSpPr>
+            <a:spLocks noGrp="1"/>
+          </p:cNvSpPr>
+          <p:nvPr>
+            <p:ph type="sldNum" sz="quarter" idx="5"/>
+          </p:nvPr>
+        </p:nvSpPr>
+        <p:spPr/>
+        <p:txBody>
+          <a:bodyPr/>
+          <a:lstStyle/>
+          <a:p>
+            <a:fld id="{A5CA74B6-EE5D-4B22-9CC7-FC7AB49D9FDA}" type="slidenum">
+              <a:rPr lang="en-US" smtClean="0"/>
+              <a:t>5</a:t>
+            </a:fld>
+            <a:endParaRPr lang="en-US"/>
+          </a:p>
+        </p:txBody>
+      </p:sp>
+    </p:spTree>
+    <p:extLst>
+      <p:ext uri="{BB962C8B-B14F-4D97-AF65-F5344CB8AC3E}">
+        <p14:creationId xmlns:p14="http://schemas.microsoft.com/office/powerpoint/2010/main" val="3410761423"/>
+      </p:ext>
+    </p:extLst>
+  </p:cSld>
+  <p:clrMapOvr>
+    <a:masterClrMapping/>
+  </p:clrMapOvr>
+</p:notes>
+</file>
+
+<file path=ppt/notesSlides/notesSlide4.xml><?xml version="1.0" encoding="utf-8"?>
+<p:notes xmlns:a="http://schemas.openxmlformats.org/drawingml/2006/main" xmlns:r="http://schemas.openxmlformats.org/officeDocument/2006/relationships" xmlns:p="http://schemas.openxmlformats.org/presentationml/2006/main">
+  <p:cSld>
+    <p:spTree>
+      <p:nvGrpSpPr>
+        <p:cNvPr id="1" name=""/>
+        <p:cNvGrpSpPr/>
+        <p:nvPr/>
+      </p:nvGrpSpPr>
+      <p:grpSpPr>
+        <a:xfrm>
+          <a:off x="0" y="0"/>
+          <a:ext cx="0" cy="0"/>
+          <a:chOff x="0" y="0"/>
+          <a:chExt cx="0" cy="0"/>
+        </a:xfrm>
+      </p:grpSpPr>
+      <p:sp>
+        <p:nvSpPr>
+          <p:cNvPr id="2" name="Slide Image Placeholder 1"/>
+          <p:cNvSpPr>
+            <a:spLocks noGrp="1" noRot="1" noChangeAspect="1"/>
+          </p:cNvSpPr>
+          <p:nvPr>
+            <p:ph type="sldImg"/>
+          </p:nvPr>
+        </p:nvSpPr>
+        <p:spPr/>
+      </p:sp>
+      <p:sp>
+        <p:nvSpPr>
+          <p:cNvPr id="3" name="Notes Placeholder 2"/>
+          <p:cNvSpPr>
+            <a:spLocks noGrp="1"/>
+          </p:cNvSpPr>
+          <p:nvPr>
+            <p:ph type="body" idx="1"/>
+          </p:nvPr>
+        </p:nvSpPr>
+        <p:spPr/>
+        <p:txBody>
+          <a:bodyPr/>
+          <a:lstStyle/>
+          <a:p>
+            <a:r>
+              <a:rPr lang="en-US" dirty="0"/>
+              <a:t>Variety of products and brands will lead to better sales. This can be re-evaluated by area as we move forward. With the general information it can be determined that one product would be better to sale </a:t>
+            </a:r>
+            <a:r>
+              <a:rPr lang="en-US"/>
+              <a:t>over another. </a:t>
+            </a:r>
+          </a:p>
+        </p:txBody>
+      </p:sp>
+      <p:sp>
+        <p:nvSpPr>
+          <p:cNvPr id="4" name="Slide Number Placeholder 3"/>
+          <p:cNvSpPr>
+            <a:spLocks noGrp="1"/>
+          </p:cNvSpPr>
+          <p:nvPr>
+            <p:ph type="sldNum" sz="quarter" idx="5"/>
+          </p:nvPr>
+        </p:nvSpPr>
+        <p:spPr/>
+        <p:txBody>
+          <a:bodyPr/>
+          <a:lstStyle/>
+          <a:p>
+            <a:fld id="{A5CA74B6-EE5D-4B22-9CC7-FC7AB49D9FDA}" type="slidenum">
+              <a:rPr lang="en-US" smtClean="0"/>
+              <a:t>6</a:t>
+            </a:fld>
+            <a:endParaRPr lang="en-US"/>
+          </a:p>
+        </p:txBody>
+      </p:sp>
+    </p:spTree>
+    <p:extLst>
+      <p:ext uri="{BB962C8B-B14F-4D97-AF65-F5344CB8AC3E}">
+        <p14:creationId xmlns:p14="http://schemas.microsoft.com/office/powerpoint/2010/main" val="1979179697"/>
+      </p:ext>
+    </p:extLst>
+  </p:cSld>
+  <p:clrMapOvr>
+    <a:masterClrMapping/>
+  </p:clrMapOvr>
+</p:notes>
+</file>
+
 <file path=ppt/slideLayouts/slideLayout1.xml><?xml version="1.0" encoding="utf-8"?>
 <p:sldLayout xmlns:a="http://schemas.openxmlformats.org/drawingml/2006/main" xmlns:r="http://schemas.openxmlformats.org/officeDocument/2006/relationships" xmlns:p="http://schemas.openxmlformats.org/presentationml/2006/main" type="title" preserve="1">
   <p:cSld name="Title Slide">
@@ -3161,7 +4008,7 @@
           <a:p>
             <a:fld id="{02AC24A9-CCB6-4F8D-B8DB-C2F3692CFA5A}" type="datetimeFigureOut">
               <a:rPr lang="en-US" smtClean="0"/>
-              <a:t>6/20/2024</a:t>
+              <a:t>6/25/2024</a:t>
             </a:fld>
             <a:endParaRPr lang="en-US" dirty="0"/>
           </a:p>
@@ -3531,7 +4378,7 @@
           <a:p>
             <a:fld id="{02AC24A9-CCB6-4F8D-B8DB-C2F3692CFA5A}" type="datetimeFigureOut">
               <a:rPr lang="en-US" smtClean="0"/>
-              <a:t>6/20/2024</a:t>
+              <a:t>6/25/2024</a:t>
             </a:fld>
             <a:endParaRPr lang="en-US"/>
           </a:p>
@@ -3740,7 +4587,7 @@
           <a:p>
             <a:fld id="{02AC24A9-CCB6-4F8D-B8DB-C2F3692CFA5A}" type="datetimeFigureOut">
               <a:rPr lang="en-US" smtClean="0"/>
-              <a:t>6/20/2024</a:t>
+              <a:t>6/25/2024</a:t>
             </a:fld>
             <a:endParaRPr lang="en-US"/>
           </a:p>
@@ -4210,7 +5057,7 @@
           <a:p>
             <a:fld id="{02AC24A9-CCB6-4F8D-B8DB-C2F3692CFA5A}" type="datetimeFigureOut">
               <a:rPr lang="en-US" smtClean="0"/>
-              <a:t>6/20/2024</a:t>
+              <a:t>6/25/2024</a:t>
             </a:fld>
             <a:endParaRPr lang="en-US"/>
           </a:p>
@@ -4664,7 +5511,7 @@
           <a:p>
             <a:fld id="{02AC24A9-CCB6-4F8D-B8DB-C2F3692CFA5A}" type="datetimeFigureOut">
               <a:rPr lang="en-US" smtClean="0"/>
-              <a:t>6/20/2024</a:t>
+              <a:t>6/25/2024</a:t>
             </a:fld>
             <a:endParaRPr lang="en-US"/>
           </a:p>
@@ -5196,7 +6043,7 @@
           <a:p>
             <a:fld id="{02AC24A9-CCB6-4F8D-B8DB-C2F3692CFA5A}" type="datetimeFigureOut">
               <a:rPr lang="en-US" smtClean="0"/>
-              <a:t>6/20/2024</a:t>
+              <a:t>6/25/2024</a:t>
             </a:fld>
             <a:endParaRPr lang="en-US"/>
           </a:p>
@@ -5895,7 +6742,7 @@
           <a:p>
             <a:fld id="{02AC24A9-CCB6-4F8D-B8DB-C2F3692CFA5A}" type="datetimeFigureOut">
               <a:rPr lang="en-US" smtClean="0"/>
-              <a:t>6/20/2024</a:t>
+              <a:t>6/25/2024</a:t>
             </a:fld>
             <a:endParaRPr lang="en-US"/>
           </a:p>
@@ -6224,7 +7071,7 @@
           <a:p>
             <a:fld id="{02AC24A9-CCB6-4F8D-B8DB-C2F3692CFA5A}" type="datetimeFigureOut">
               <a:rPr lang="en-US" smtClean="0"/>
-              <a:t>6/20/2024</a:t>
+              <a:t>6/25/2024</a:t>
             </a:fld>
             <a:endParaRPr lang="en-US"/>
           </a:p>
@@ -6337,7 +7184,7 @@
           <a:p>
             <a:fld id="{02AC24A9-CCB6-4F8D-B8DB-C2F3692CFA5A}" type="datetimeFigureOut">
               <a:rPr lang="en-US" smtClean="0"/>
-              <a:t>6/20/2024</a:t>
+              <a:t>6/25/2024</a:t>
             </a:fld>
             <a:endParaRPr lang="en-US"/>
           </a:p>
@@ -6832,7 +7679,7 @@
           <a:p>
             <a:fld id="{02AC24A9-CCB6-4F8D-B8DB-C2F3692CFA5A}" type="datetimeFigureOut">
               <a:rPr lang="en-US" smtClean="0"/>
-              <a:t>6/20/2024</a:t>
+              <a:t>6/25/2024</a:t>
             </a:fld>
             <a:endParaRPr lang="en-US" dirty="0"/>
           </a:p>
@@ -7309,7 +8156,7 @@
           <a:p>
             <a:fld id="{02AC24A9-CCB6-4F8D-B8DB-C2F3692CFA5A}" type="datetimeFigureOut">
               <a:rPr lang="en-US" smtClean="0"/>
-              <a:t>6/20/2024</a:t>
+              <a:t>6/25/2024</a:t>
             </a:fld>
             <a:endParaRPr lang="en-US"/>
           </a:p>
@@ -7552,7 +8399,7 @@
           <a:p>
             <a:fld id="{02AC24A9-CCB6-4F8D-B8DB-C2F3692CFA5A}" type="datetimeFigureOut">
               <a:rPr lang="en-US" smtClean="0"/>
-              <a:t>6/20/2024</a:t>
+              <a:t>6/25/2024</a:t>
             </a:fld>
             <a:endParaRPr lang="en-US"/>
           </a:p>
@@ -8997,7 +9844,7 @@
           <p:nvPr/>
         </p:nvPicPr>
         <p:blipFill>
-          <a:blip r:embed="rId2"/>
+          <a:blip r:embed="rId3"/>
           <a:stretch>
             <a:fillRect/>
           </a:stretch>
@@ -9745,7 +10592,7 @@
           <p:nvPr/>
         </p:nvPicPr>
         <p:blipFill>
-          <a:blip r:embed="rId2"/>
+          <a:blip r:embed="rId3"/>
           <a:stretch>
             <a:fillRect/>
           </a:stretch>
@@ -9800,10 +10647,10 @@
       </p:grpSpPr>
       <p:sp useBgFill="1">
         <p:nvSpPr>
-          <p:cNvPr id="10" name="Rectangle 9">
+          <p:cNvPr id="21" name="Rectangle 20">
             <a:extLst>
               <a:ext uri="{FF2B5EF4-FFF2-40B4-BE49-F238E27FC236}">
-                <a16:creationId xmlns:a16="http://schemas.microsoft.com/office/drawing/2014/main" id="{2C9A9DA9-7DC8-488B-A882-123947B0F3D9}"/>
+                <a16:creationId xmlns:a16="http://schemas.microsoft.com/office/drawing/2014/main" id="{385E1BDC-A9B0-4A87-82E3-F3187F69A802}"/>
               </a:ext>
               <a:ext uri="{C183D7F6-B498-43B3-948B-1728B52AA6E4}">
                 <adec:decorative xmlns:adec="http://schemas.microsoft.com/office/drawing/2017/decorative" val="1"/>
@@ -9860,10 +10707,10 @@
       </p:sp>
       <p:sp useBgFill="1">
         <p:nvSpPr>
-          <p:cNvPr id="12" name="Rectangle 11">
+          <p:cNvPr id="23" name="Rectangle 22">
             <a:extLst>
               <a:ext uri="{FF2B5EF4-FFF2-40B4-BE49-F238E27FC236}">
-                <a16:creationId xmlns:a16="http://schemas.microsoft.com/office/drawing/2014/main" id="{57F6BDD4-E066-4008-8011-6CC31AEB4556}"/>
+                <a16:creationId xmlns:a16="http://schemas.microsoft.com/office/drawing/2014/main" id="{0990C621-3B8B-4820-8328-D47EF7CE823C}"/>
               </a:ext>
               <a:ext uri="{C183D7F6-B498-43B3-948B-1728B52AA6E4}">
                 <adec:decorative xmlns:adec="http://schemas.microsoft.com/office/drawing/2017/decorative" val="1"/>
@@ -9883,13 +10730,13 @@
         </p:nvSpPr>
         <p:spPr>
           <a:xfrm>
-            <a:off x="409575" y="633619"/>
-            <a:ext cx="4279383" cy="5495925"/>
+            <a:off x="554416" y="365125"/>
+            <a:ext cx="11167447" cy="2089317"/>
           </a:xfrm>
           <a:prstGeom prst="rect">
             <a:avLst/>
           </a:prstGeom>
-          <a:ln w="9525">
+          <a:ln w="12700">
             <a:solidFill>
               <a:schemeClr val="tx2">
                 <a:lumMod val="10000"/>
@@ -9899,7 +10746,7 @@
           </a:ln>
           <a:effectLst>
             <a:outerShdw blurRad="50800" dist="38100" dir="2700000" algn="tl" rotWithShape="0">
-              <a:schemeClr val="bg1">
+              <a:schemeClr val="bg2">
                 <a:lumMod val="85000"/>
                 <a:alpha val="30000"/>
               </a:schemeClr>
@@ -9978,8 +10825,8 @@
         </p:nvSpPr>
         <p:spPr>
           <a:xfrm>
-            <a:off x="841247" y="978619"/>
-            <a:ext cx="3410712" cy="1106424"/>
+            <a:off x="1051560" y="586822"/>
+            <a:ext cx="3538728" cy="1645920"/>
           </a:xfrm>
         </p:spPr>
         <p:txBody>
@@ -9989,7 +10836,7 @@
           <a:lstStyle/>
           <a:p>
             <a:r>
-              <a:rPr lang="en-US" sz="2800"/>
+              <a:rPr lang="en-US" sz="3200"/>
               <a:t>Who is buying?</a:t>
             </a:r>
           </a:p>
@@ -9997,10 +10844,10 @@
       </p:sp>
       <p:sp>
         <p:nvSpPr>
-          <p:cNvPr id="14" name="Rectangle 13">
+          <p:cNvPr id="25" name="Rectangle 24">
             <a:extLst>
               <a:ext uri="{FF2B5EF4-FFF2-40B4-BE49-F238E27FC236}">
-                <a16:creationId xmlns:a16="http://schemas.microsoft.com/office/drawing/2014/main" id="{2711A8FB-68FC-45FC-B01E-38F809E2D439}"/>
+                <a16:creationId xmlns:a16="http://schemas.microsoft.com/office/drawing/2014/main" id="{C1A2385B-1D2A-4E17-84FA-6CB7F0AAE473}"/>
               </a:ext>
               <a:ext uri="{C183D7F6-B498-43B3-948B-1728B52AA6E4}">
                 <adec:decorative xmlns:adec="http://schemas.microsoft.com/office/drawing/2017/decorative" val="1"/>
@@ -10020,7 +10867,7 @@
         </p:nvSpPr>
         <p:spPr>
           <a:xfrm>
-            <a:off x="345567" y="1171300"/>
+            <a:off x="490408" y="1057739"/>
             <a:ext cx="128016" cy="704088"/>
           </a:xfrm>
           <a:prstGeom prst="rect">
@@ -10032,6 +10879,102 @@
           <a:ln>
             <a:noFill/>
           </a:ln>
+        </p:spPr>
+        <p:style>
+          <a:lnRef idx="2">
+            <a:schemeClr val="accent1">
+              <a:shade val="50000"/>
+            </a:schemeClr>
+          </a:lnRef>
+          <a:fillRef idx="1">
+            <a:schemeClr val="accent1"/>
+          </a:fillRef>
+          <a:effectRef idx="0">
+            <a:schemeClr val="accent1"/>
+          </a:effectRef>
+          <a:fontRef idx="minor">
+            <a:schemeClr val="lt1"/>
+          </a:fontRef>
+        </p:style>
+        <p:txBody>
+          <a:bodyPr rtlCol="0" anchor="ctr"/>
+          <a:lstStyle/>
+          <a:p>
+            <a:pPr marL="0" marR="0" lvl="0" indent="0" algn="ctr" defTabSz="914400" rtl="0" eaLnBrk="1" fontAlgn="auto" latinLnBrk="0" hangingPunct="1">
+              <a:lnSpc>
+                <a:spcPct val="100000"/>
+              </a:lnSpc>
+              <a:spcBef>
+                <a:spcPts val="0"/>
+              </a:spcBef>
+              <a:spcAft>
+                <a:spcPts val="0"/>
+              </a:spcAft>
+              <a:buClrTx/>
+              <a:buSzTx/>
+              <a:buFontTx/>
+              <a:buNone/>
+              <a:tabLst/>
+              <a:defRPr/>
+            </a:pPr>
+            <a:endParaRPr kumimoji="0" lang="en-US" sz="1800" b="0" i="0" u="none" strike="noStrike" kern="1200" cap="none" spc="0" normalizeH="0" baseline="0" noProof="0" dirty="0">
+              <a:ln>
+                <a:noFill/>
+              </a:ln>
+              <a:solidFill>
+                <a:prstClr val="white"/>
+              </a:solidFill>
+              <a:effectLst/>
+              <a:uLnTx/>
+              <a:uFillTx/>
+              <a:latin typeface="Calibri" panose="020F0502020204030204"/>
+              <a:ea typeface="+mn-ea"/>
+              <a:cs typeface="+mn-cs"/>
+            </a:endParaRPr>
+          </a:p>
+        </p:txBody>
+      </p:sp>
+      <p:sp>
+        <p:nvSpPr>
+          <p:cNvPr id="27" name="Rectangle 26">
+            <a:extLst>
+              <a:ext uri="{FF2B5EF4-FFF2-40B4-BE49-F238E27FC236}">
+                <a16:creationId xmlns:a16="http://schemas.microsoft.com/office/drawing/2014/main" id="{5E791F2F-79DB-4CC0-9FA1-001E3E91E8B7}"/>
+              </a:ext>
+              <a:ext uri="{C183D7F6-B498-43B3-948B-1728B52AA6E4}">
+                <adec:decorative xmlns:adec="http://schemas.microsoft.com/office/drawing/2017/decorative" val="1"/>
+              </a:ext>
+            </a:extLst>
+          </p:cNvPr>
+          <p:cNvSpPr>
+            <a:spLocks noGrp="1" noRot="1" noChangeAspect="1" noMove="1" noResize="1" noEditPoints="1" noAdjustHandles="1" noChangeArrowheads="1" noChangeShapeType="1" noTextEdit="1"/>
+          </p:cNvSpPr>
+          <p:nvPr>
+            <p:extLst>
+              <p:ext uri="{386F3935-93C4-4BCD-93E2-E3B085C9AB24}">
+                <p16:designElem xmlns:p16="http://schemas.microsoft.com/office/powerpoint/2015/main" val="1"/>
+              </p:ext>
+            </p:extLst>
+          </p:nvPr>
+        </p:nvSpPr>
+        <p:spPr>
+          <a:xfrm rot="5400000">
+            <a:off x="4248113" y="1405210"/>
+            <a:ext cx="1463040" cy="9144"/>
+          </a:xfrm>
+          <a:prstGeom prst="rect">
+            <a:avLst/>
+          </a:prstGeom>
+          <a:solidFill>
+            <a:schemeClr val="tx2">
+              <a:lumMod val="25000"/>
+              <a:lumOff val="75000"/>
+            </a:schemeClr>
+          </a:solidFill>
+          <a:ln w="3175">
+            <a:noFill/>
+          </a:ln>
+          <a:effectLst/>
         </p:spPr>
         <p:style>
           <a:lnRef idx="2">
@@ -10089,102 +11032,6 @@
       </p:sp>
       <p:sp>
         <p:nvSpPr>
-          <p:cNvPr id="16" name="Rectangle 15">
-            <a:extLst>
-              <a:ext uri="{FF2B5EF4-FFF2-40B4-BE49-F238E27FC236}">
-                <a16:creationId xmlns:a16="http://schemas.microsoft.com/office/drawing/2014/main" id="{2A865FE3-5FC9-4049-87CF-30019C46C0F5}"/>
-              </a:ext>
-              <a:ext uri="{C183D7F6-B498-43B3-948B-1728B52AA6E4}">
-                <adec:decorative xmlns:adec="http://schemas.microsoft.com/office/drawing/2017/decorative" val="1"/>
-              </a:ext>
-            </a:extLst>
-          </p:cNvPr>
-          <p:cNvSpPr>
-            <a:spLocks noGrp="1" noRot="1" noChangeAspect="1" noMove="1" noResize="1" noEditPoints="1" noAdjustHandles="1" noChangeArrowheads="1" noChangeShapeType="1" noTextEdit="1"/>
-          </p:cNvSpPr>
-          <p:nvPr>
-            <p:extLst>
-              <p:ext uri="{386F3935-93C4-4BCD-93E2-E3B085C9AB24}">
-                <p16:designElem xmlns:p16="http://schemas.microsoft.com/office/powerpoint/2015/main" val="1"/>
-              </p:ext>
-            </p:extLst>
-          </p:nvPr>
-        </p:nvSpPr>
-        <p:spPr>
-          <a:xfrm>
-            <a:off x="877459" y="2093976"/>
-            <a:ext cx="3328416" cy="9144"/>
-          </a:xfrm>
-          <a:prstGeom prst="rect">
-            <a:avLst/>
-          </a:prstGeom>
-          <a:solidFill>
-            <a:schemeClr val="tx2">
-              <a:lumMod val="25000"/>
-              <a:lumOff val="75000"/>
-            </a:schemeClr>
-          </a:solidFill>
-          <a:ln w="3175">
-            <a:noFill/>
-          </a:ln>
-          <a:effectLst/>
-        </p:spPr>
-        <p:style>
-          <a:lnRef idx="2">
-            <a:schemeClr val="accent1">
-              <a:shade val="50000"/>
-            </a:schemeClr>
-          </a:lnRef>
-          <a:fillRef idx="1">
-            <a:schemeClr val="accent1"/>
-          </a:fillRef>
-          <a:effectRef idx="0">
-            <a:schemeClr val="accent1"/>
-          </a:effectRef>
-          <a:fontRef idx="minor">
-            <a:schemeClr val="lt1"/>
-          </a:fontRef>
-        </p:style>
-        <p:txBody>
-          <a:bodyPr rtlCol="0" anchor="ctr"/>
-          <a:lstStyle/>
-          <a:p>
-            <a:pPr marL="0" marR="0" lvl="0" indent="0" algn="ctr" defTabSz="914400" rtl="0" eaLnBrk="1" fontAlgn="auto" latinLnBrk="0" hangingPunct="1">
-              <a:lnSpc>
-                <a:spcPct val="100000"/>
-              </a:lnSpc>
-              <a:spcBef>
-                <a:spcPts val="0"/>
-              </a:spcBef>
-              <a:spcAft>
-                <a:spcPts val="0"/>
-              </a:spcAft>
-              <a:buClrTx/>
-              <a:buSzTx/>
-              <a:buFontTx/>
-              <a:buNone/>
-              <a:tabLst/>
-              <a:defRPr/>
-            </a:pPr>
-            <a:endParaRPr kumimoji="0" lang="en-US" sz="1800" b="0" i="0" u="none" strike="noStrike" kern="1200" cap="none" spc="0" normalizeH="0" baseline="0" noProof="0">
-              <a:ln>
-                <a:noFill/>
-              </a:ln>
-              <a:solidFill>
-                <a:prstClr val="white"/>
-              </a:solidFill>
-              <a:effectLst/>
-              <a:uLnTx/>
-              <a:uFillTx/>
-              <a:latin typeface="Calibri" panose="020F0502020204030204"/>
-              <a:ea typeface="+mn-ea"/>
-              <a:cs typeface="+mn-cs"/>
-            </a:endParaRPr>
-          </a:p>
-        </p:txBody>
-      </p:sp>
-      <p:sp>
-        <p:nvSpPr>
           <p:cNvPr id="3" name="Content Placeholder 2">
             <a:extLst>
               <a:ext uri="{FF2B5EF4-FFF2-40B4-BE49-F238E27FC236}">
@@ -10201,24 +11048,24 @@
         </p:nvSpPr>
         <p:spPr>
           <a:xfrm>
-            <a:off x="841248" y="2252870"/>
-            <a:ext cx="3412219" cy="3560251"/>
+            <a:off x="5349240" y="586822"/>
+            <a:ext cx="6007608" cy="1645920"/>
           </a:xfrm>
         </p:spPr>
         <p:txBody>
-          <a:bodyPr>
+          <a:bodyPr anchor="ctr">
             <a:normAutofit/>
           </a:bodyPr>
           <a:lstStyle/>
           <a:p>
             <a:r>
-              <a:rPr lang="en-US" sz="1700"/>
+              <a:rPr lang="en-US" sz="1800"/>
               <a:t>Everyone</a:t>
             </a:r>
           </a:p>
           <a:p>
             <a:r>
-              <a:rPr lang="en-US" sz="1700"/>
+              <a:rPr lang="en-US" sz="1800"/>
               <a:t>No formal correlation</a:t>
             </a:r>
           </a:p>
@@ -10239,15 +11086,45 @@
           <p:nvPr/>
         </p:nvPicPr>
         <p:blipFill>
-          <a:blip r:embed="rId2"/>
+          <a:blip r:embed="rId3"/>
           <a:stretch>
             <a:fillRect/>
           </a:stretch>
         </p:blipFill>
         <p:spPr>
           <a:xfrm>
-            <a:off x="5225863" y="630936"/>
-            <a:ext cx="6446386" cy="5495544"/>
+            <a:off x="1255215" y="2729397"/>
+            <a:ext cx="4086644" cy="3483864"/>
+          </a:xfrm>
+          <a:prstGeom prst="rect">
+            <a:avLst/>
+          </a:prstGeom>
+        </p:spPr>
+      </p:pic>
+      <p:pic>
+        <p:nvPicPr>
+          <p:cNvPr id="6" name="Picture 5">
+            <a:extLst>
+              <a:ext uri="{FF2B5EF4-FFF2-40B4-BE49-F238E27FC236}">
+                <a16:creationId xmlns:a16="http://schemas.microsoft.com/office/drawing/2014/main" id="{0F8D3F0B-0A4C-30C0-EDC0-9BFF90C5BC00}"/>
+              </a:ext>
+            </a:extLst>
+          </p:cNvPr>
+          <p:cNvPicPr>
+            <a:picLocks noChangeAspect="1"/>
+          </p:cNvPicPr>
+          <p:nvPr/>
+        </p:nvPicPr>
+        <p:blipFill>
+          <a:blip r:embed="rId4"/>
+          <a:stretch>
+            <a:fillRect/>
+          </a:stretch>
+        </p:blipFill>
+        <p:spPr>
+          <a:xfrm>
+            <a:off x="6198781" y="3509105"/>
+            <a:ext cx="5523082" cy="1924448"/>
           </a:xfrm>
           <a:prstGeom prst="rect">
             <a:avLst/>
@@ -10652,7 +11529,7 @@
           <p:nvPr/>
         </p:nvPicPr>
         <p:blipFill rotWithShape="1">
-          <a:blip r:embed="rId2"/>
+          <a:blip r:embed="rId3"/>
           <a:srcRect t="12232" b="6541"/>
           <a:stretch/>
         </p:blipFill>
@@ -11233,4 +12110,319 @@
     </a:ext>
   </a:extLst>
 </a:theme>
+</file>
+
+<file path=ppt/theme/theme2.xml><?xml version="1.0" encoding="utf-8"?>
+<a:theme xmlns:a="http://schemas.openxmlformats.org/drawingml/2006/main" name="Office Theme">
+  <a:themeElements>
+    <a:clrScheme name="Office">
+      <a:dk1>
+        <a:sysClr val="windowText" lastClr="000000"/>
+      </a:dk1>
+      <a:lt1>
+        <a:sysClr val="window" lastClr="FFFFFF"/>
+      </a:lt1>
+      <a:dk2>
+        <a:srgbClr val="0E2841"/>
+      </a:dk2>
+      <a:lt2>
+        <a:srgbClr val="E8E8E8"/>
+      </a:lt2>
+      <a:accent1>
+        <a:srgbClr val="156082"/>
+      </a:accent1>
+      <a:accent2>
+        <a:srgbClr val="E97132"/>
+      </a:accent2>
+      <a:accent3>
+        <a:srgbClr val="196B24"/>
+      </a:accent3>
+      <a:accent4>
+        <a:srgbClr val="0F9ED5"/>
+      </a:accent4>
+      <a:accent5>
+        <a:srgbClr val="A02B93"/>
+      </a:accent5>
+      <a:accent6>
+        <a:srgbClr val="4EA72E"/>
+      </a:accent6>
+      <a:hlink>
+        <a:srgbClr val="467886"/>
+      </a:hlink>
+      <a:folHlink>
+        <a:srgbClr val="96607D"/>
+      </a:folHlink>
+    </a:clrScheme>
+    <a:fontScheme name="Office">
+      <a:majorFont>
+        <a:latin typeface="Aptos Display" panose="02110004020202020204"/>
+        <a:ea typeface=""/>
+        <a:cs typeface=""/>
+        <a:font script="Jpan" typeface="游ゴシック Light"/>
+        <a:font script="Hang" typeface="맑은 고딕"/>
+        <a:font script="Hans" typeface="等线 Light"/>
+        <a:font script="Hant" typeface="新細明體"/>
+        <a:font script="Arab" typeface="Times New Roman"/>
+        <a:font script="Hebr" typeface="Times New Roman"/>
+        <a:font script="Thai" typeface="Angsana New"/>
+        <a:font script="Ethi" typeface="Nyala"/>
+        <a:font script="Beng" typeface="Vrinda"/>
+        <a:font script="Gujr" typeface="Shruti"/>
+        <a:font script="Khmr" typeface="MoolBoran"/>
+        <a:font script="Knda" typeface="Tunga"/>
+        <a:font script="Guru" typeface="Raavi"/>
+        <a:font script="Cans" typeface="Euphemia"/>
+        <a:font script="Cher" typeface="Plantagenet Cherokee"/>
+        <a:font script="Yiii" typeface="Microsoft Yi Baiti"/>
+        <a:font script="Tibt" typeface="Microsoft Himalaya"/>
+        <a:font script="Thaa" typeface="MV Boli"/>
+        <a:font script="Deva" typeface="Mangal"/>
+        <a:font script="Telu" typeface="Gautami"/>
+        <a:font script="Taml" typeface="Latha"/>
+        <a:font script="Syrc" typeface="Estrangelo Edessa"/>
+        <a:font script="Orya" typeface="Kalinga"/>
+        <a:font script="Mlym" typeface="Kartika"/>
+        <a:font script="Laoo" typeface="DokChampa"/>
+        <a:font script="Sinh" typeface="Iskoola Pota"/>
+        <a:font script="Mong" typeface="Mongolian Baiti"/>
+        <a:font script="Viet" typeface="Times New Roman"/>
+        <a:font script="Uigh" typeface="Microsoft Uighur"/>
+        <a:font script="Geor" typeface="Sylfaen"/>
+        <a:font script="Armn" typeface="Arial"/>
+        <a:font script="Bugi" typeface="Leelawadee UI"/>
+        <a:font script="Bopo" typeface="Microsoft JhengHei"/>
+        <a:font script="Java" typeface="Javanese Text"/>
+        <a:font script="Lisu" typeface="Segoe UI"/>
+        <a:font script="Mymr" typeface="Myanmar Text"/>
+        <a:font script="Nkoo" typeface="Ebrima"/>
+        <a:font script="Olck" typeface="Nirmala UI"/>
+        <a:font script="Osma" typeface="Ebrima"/>
+        <a:font script="Phag" typeface="Phagspa"/>
+        <a:font script="Syrn" typeface="Estrangelo Edessa"/>
+        <a:font script="Syrj" typeface="Estrangelo Edessa"/>
+        <a:font script="Syre" typeface="Estrangelo Edessa"/>
+        <a:font script="Sora" typeface="Nirmala UI"/>
+        <a:font script="Tale" typeface="Microsoft Tai Le"/>
+        <a:font script="Talu" typeface="Microsoft New Tai Lue"/>
+        <a:font script="Tfng" typeface="Ebrima"/>
+      </a:majorFont>
+      <a:minorFont>
+        <a:latin typeface="Aptos" panose="02110004020202020204"/>
+        <a:ea typeface=""/>
+        <a:cs typeface=""/>
+        <a:font script="Jpan" typeface="游ゴシック"/>
+        <a:font script="Hang" typeface="맑은 고딕"/>
+        <a:font script="Hans" typeface="等线"/>
+        <a:font script="Hant" typeface="新細明體"/>
+        <a:font script="Arab" typeface="Arial"/>
+        <a:font script="Hebr" typeface="Arial"/>
+        <a:font script="Thai" typeface="Cordia New"/>
+        <a:font script="Ethi" typeface="Nyala"/>
+        <a:font script="Beng" typeface="Vrinda"/>
+        <a:font script="Gujr" typeface="Shruti"/>
+        <a:font script="Khmr" typeface="DaunPenh"/>
+        <a:font script="Knda" typeface="Tunga"/>
+        <a:font script="Guru" typeface="Raavi"/>
+        <a:font script="Cans" typeface="Euphemia"/>
+        <a:font script="Cher" typeface="Plantagenet Cherokee"/>
+        <a:font script="Yiii" typeface="Microsoft Yi Baiti"/>
+        <a:font script="Tibt" typeface="Microsoft Himalaya"/>
+        <a:font script="Thaa" typeface="MV Boli"/>
+        <a:font script="Deva" typeface="Mangal"/>
+        <a:font script="Telu" typeface="Gautami"/>
+        <a:font script="Taml" typeface="Latha"/>
+        <a:font script="Syrc" typeface="Estrangelo Edessa"/>
+        <a:font script="Orya" typeface="Kalinga"/>
+        <a:font script="Mlym" typeface="Kartika"/>
+        <a:font script="Laoo" typeface="DokChampa"/>
+        <a:font script="Sinh" typeface="Iskoola Pota"/>
+        <a:font script="Mong" typeface="Mongolian Baiti"/>
+        <a:font script="Viet" typeface="Arial"/>
+        <a:font script="Uigh" typeface="Microsoft Uighur"/>
+        <a:font script="Geor" typeface="Sylfaen"/>
+        <a:font script="Armn" typeface="Arial"/>
+        <a:font script="Bugi" typeface="Leelawadee UI"/>
+        <a:font script="Bopo" typeface="Microsoft JhengHei"/>
+        <a:font script="Java" typeface="Javanese Text"/>
+        <a:font script="Lisu" typeface="Segoe UI"/>
+        <a:font script="Mymr" typeface="Myanmar Text"/>
+        <a:font script="Nkoo" typeface="Ebrima"/>
+        <a:font script="Olck" typeface="Nirmala UI"/>
+        <a:font script="Osma" typeface="Ebrima"/>
+        <a:font script="Phag" typeface="Phagspa"/>
+        <a:font script="Syrn" typeface="Estrangelo Edessa"/>
+        <a:font script="Syrj" typeface="Estrangelo Edessa"/>
+        <a:font script="Syre" typeface="Estrangelo Edessa"/>
+        <a:font script="Sora" typeface="Nirmala UI"/>
+        <a:font script="Tale" typeface="Microsoft Tai Le"/>
+        <a:font script="Talu" typeface="Microsoft New Tai Lue"/>
+        <a:font script="Tfng" typeface="Ebrima"/>
+      </a:minorFont>
+    </a:fontScheme>
+    <a:fmtScheme name="Office">
+      <a:fillStyleLst>
+        <a:solidFill>
+          <a:schemeClr val="phClr"/>
+        </a:solidFill>
+        <a:gradFill rotWithShape="1">
+          <a:gsLst>
+            <a:gs pos="0">
+              <a:schemeClr val="phClr">
+                <a:lumMod val="110000"/>
+                <a:satMod val="105000"/>
+                <a:tint val="67000"/>
+              </a:schemeClr>
+            </a:gs>
+            <a:gs pos="50000">
+              <a:schemeClr val="phClr">
+                <a:lumMod val="105000"/>
+                <a:satMod val="103000"/>
+                <a:tint val="73000"/>
+              </a:schemeClr>
+            </a:gs>
+            <a:gs pos="100000">
+              <a:schemeClr val="phClr">
+                <a:lumMod val="105000"/>
+                <a:satMod val="109000"/>
+                <a:tint val="81000"/>
+              </a:schemeClr>
+            </a:gs>
+          </a:gsLst>
+          <a:lin ang="5400000" scaled="0"/>
+        </a:gradFill>
+        <a:gradFill rotWithShape="1">
+          <a:gsLst>
+            <a:gs pos="0">
+              <a:schemeClr val="phClr">
+                <a:satMod val="103000"/>
+                <a:lumMod val="102000"/>
+                <a:tint val="94000"/>
+              </a:schemeClr>
+            </a:gs>
+            <a:gs pos="50000">
+              <a:schemeClr val="phClr">
+                <a:satMod val="110000"/>
+                <a:lumMod val="100000"/>
+                <a:shade val="100000"/>
+              </a:schemeClr>
+            </a:gs>
+            <a:gs pos="100000">
+              <a:schemeClr val="phClr">
+                <a:lumMod val="99000"/>
+                <a:satMod val="120000"/>
+                <a:shade val="78000"/>
+              </a:schemeClr>
+            </a:gs>
+          </a:gsLst>
+          <a:lin ang="5400000" scaled="0"/>
+        </a:gradFill>
+      </a:fillStyleLst>
+      <a:lnStyleLst>
+        <a:ln w="12700" cap="flat" cmpd="sng" algn="ctr">
+          <a:solidFill>
+            <a:schemeClr val="phClr"/>
+          </a:solidFill>
+          <a:prstDash val="solid"/>
+          <a:miter lim="800000"/>
+        </a:ln>
+        <a:ln w="19050" cap="flat" cmpd="sng" algn="ctr">
+          <a:solidFill>
+            <a:schemeClr val="phClr"/>
+          </a:solidFill>
+          <a:prstDash val="solid"/>
+          <a:miter lim="800000"/>
+        </a:ln>
+        <a:ln w="25400" cap="flat" cmpd="sng" algn="ctr">
+          <a:solidFill>
+            <a:schemeClr val="phClr"/>
+          </a:solidFill>
+          <a:prstDash val="solid"/>
+          <a:miter lim="800000"/>
+        </a:ln>
+      </a:lnStyleLst>
+      <a:effectStyleLst>
+        <a:effectStyle>
+          <a:effectLst/>
+        </a:effectStyle>
+        <a:effectStyle>
+          <a:effectLst/>
+        </a:effectStyle>
+        <a:effectStyle>
+          <a:effectLst>
+            <a:outerShdw blurRad="57150" dist="19050" dir="5400000" algn="ctr" rotWithShape="0">
+              <a:srgbClr val="000000">
+                <a:alpha val="63000"/>
+              </a:srgbClr>
+            </a:outerShdw>
+          </a:effectLst>
+        </a:effectStyle>
+      </a:effectStyleLst>
+      <a:bgFillStyleLst>
+        <a:solidFill>
+          <a:schemeClr val="phClr"/>
+        </a:solidFill>
+        <a:solidFill>
+          <a:schemeClr val="phClr">
+            <a:tint val="95000"/>
+            <a:satMod val="170000"/>
+          </a:schemeClr>
+        </a:solidFill>
+        <a:gradFill rotWithShape="1">
+          <a:gsLst>
+            <a:gs pos="0">
+              <a:schemeClr val="phClr">
+                <a:tint val="93000"/>
+                <a:satMod val="150000"/>
+                <a:shade val="98000"/>
+                <a:lumMod val="102000"/>
+              </a:schemeClr>
+            </a:gs>
+            <a:gs pos="50000">
+              <a:schemeClr val="phClr">
+                <a:tint val="98000"/>
+                <a:satMod val="130000"/>
+                <a:shade val="90000"/>
+                <a:lumMod val="103000"/>
+              </a:schemeClr>
+            </a:gs>
+            <a:gs pos="100000">
+              <a:schemeClr val="phClr">
+                <a:shade val="63000"/>
+                <a:satMod val="120000"/>
+              </a:schemeClr>
+            </a:gs>
+          </a:gsLst>
+          <a:lin ang="5400000" scaled="0"/>
+        </a:gradFill>
+      </a:bgFillStyleLst>
+    </a:fmtScheme>
+  </a:themeElements>
+  <a:objectDefaults>
+    <a:lnDef>
+      <a:spPr/>
+      <a:bodyPr/>
+      <a:lstStyle/>
+      <a:style>
+        <a:lnRef idx="2">
+          <a:schemeClr val="accent1"/>
+        </a:lnRef>
+        <a:fillRef idx="0">
+          <a:schemeClr val="accent1"/>
+        </a:fillRef>
+        <a:effectRef idx="1">
+          <a:schemeClr val="accent1"/>
+        </a:effectRef>
+        <a:fontRef idx="minor">
+          <a:schemeClr val="tx1"/>
+        </a:fontRef>
+      </a:style>
+    </a:lnDef>
+  </a:objectDefaults>
+  <a:extraClrSchemeLst/>
+  <a:extLst>
+    <a:ext uri="{05A4C25C-085E-4340-85A3-A5531E510DB2}">
+      <thm15:themeFamily xmlns:thm15="http://schemas.microsoft.com/office/thememl/2012/main" name="Office Theme" id="{2E142A2C-CD16-42D6-873A-C26D2A0506FA}" vid="{1BDDFF52-6CD6-40A5-AB3C-68EB2F1E4D0A}"/>
+    </a:ext>
+  </a:extLst>
+</a:theme>
 </file>
</xml_diff>